<commit_message>
A few days of progress with new formulations of Reff and W bp estimation from model parameters, mean worm burden and infected snail prevalence. Some restructuring to separate age structured model functionsand age structured reproduction numbers and breakpoint estimation
</commit_message>
<xml_diff>
--- a/Other/NIMBioS_2019.pptx
+++ b/Other/NIMBioS_2019.pptx
@@ -302,7 +302,7 @@
           <a:p>
             <a:fld id="{180B0447-16F7-234F-A67A-00B099208B6B}" type="datetimeFigureOut">
               <a:rPr lang="en-US" smtClean="0"/>
-              <a:t>7/8/2019</a:t>
+              <a:t>7/10/2019</a:t>
             </a:fld>
             <a:endParaRPr lang="en-US"/>
           </a:p>
@@ -468,7 +468,7 @@
           <a:p>
             <a:fld id="{1DBC1458-292F-3847-8603-B82856C6141D}" type="datetimeFigureOut">
               <a:rPr lang="en-US" smtClean="0"/>
-              <a:t>7/8/2019</a:t>
+              <a:t>7/10/2019</a:t>
             </a:fld>
             <a:endParaRPr lang="en-US"/>
           </a:p>
@@ -822,6 +822,90 @@
 </file>
 
 <file path=ppt/notesSlides/notesSlide2.xml><?xml version="1.0" encoding="utf-8"?>
+<p:notes xmlns:a="http://schemas.openxmlformats.org/drawingml/2006/main" xmlns:r="http://schemas.openxmlformats.org/officeDocument/2006/relationships" xmlns:p="http://schemas.openxmlformats.org/presentationml/2006/main">
+  <p:cSld>
+    <p:spTree>
+      <p:nvGrpSpPr>
+        <p:cNvPr id="1" name=""/>
+        <p:cNvGrpSpPr/>
+        <p:nvPr/>
+      </p:nvGrpSpPr>
+      <p:grpSpPr>
+        <a:xfrm>
+          <a:off x="0" y="0"/>
+          <a:ext cx="0" cy="0"/>
+          <a:chOff x="0" y="0"/>
+          <a:chExt cx="0" cy="0"/>
+        </a:xfrm>
+      </p:grpSpPr>
+      <p:sp>
+        <p:nvSpPr>
+          <p:cNvPr id="2" name="Slide Image Placeholder 1"/>
+          <p:cNvSpPr>
+            <a:spLocks noGrp="1" noRot="1" noChangeAspect="1"/>
+          </p:cNvSpPr>
+          <p:nvPr>
+            <p:ph type="sldImg"/>
+          </p:nvPr>
+        </p:nvSpPr>
+        <p:spPr/>
+      </p:sp>
+      <p:sp>
+        <p:nvSpPr>
+          <p:cNvPr id="3" name="Notes Placeholder 2"/>
+          <p:cNvSpPr>
+            <a:spLocks noGrp="1"/>
+          </p:cNvSpPr>
+          <p:nvPr>
+            <p:ph type="body" idx="1"/>
+          </p:nvPr>
+        </p:nvSpPr>
+        <p:spPr/>
+        <p:txBody>
+          <a:bodyPr/>
+          <a:lstStyle/>
+          <a:p>
+            <a:endParaRPr lang="en-US" dirty="0"/>
+          </a:p>
+        </p:txBody>
+      </p:sp>
+      <p:sp>
+        <p:nvSpPr>
+          <p:cNvPr id="4" name="Slide Number Placeholder 3"/>
+          <p:cNvSpPr>
+            <a:spLocks noGrp="1"/>
+          </p:cNvSpPr>
+          <p:nvPr>
+            <p:ph type="sldNum" sz="quarter" idx="10"/>
+          </p:nvPr>
+        </p:nvSpPr>
+        <p:spPr/>
+        <p:txBody>
+          <a:bodyPr/>
+          <a:lstStyle/>
+          <a:p>
+            <a:fld id="{B73E644B-9D12-D440-B002-B1721AD7B1C7}" type="slidenum">
+              <a:rPr lang="en-US" smtClean="0"/>
+              <a:t>4</a:t>
+            </a:fld>
+            <a:endParaRPr lang="en-US"/>
+          </a:p>
+        </p:txBody>
+      </p:sp>
+    </p:spTree>
+    <p:extLst>
+      <p:ext uri="{BB962C8B-B14F-4D97-AF65-F5344CB8AC3E}">
+        <p14:creationId xmlns:p14="http://schemas.microsoft.com/office/powerpoint/2010/main" val="3001177837"/>
+      </p:ext>
+    </p:extLst>
+  </p:cSld>
+  <p:clrMapOvr>
+    <a:masterClrMapping/>
+  </p:clrMapOvr>
+</p:notes>
+</file>
+
+<file path=ppt/notesSlides/notesSlide3.xml><?xml version="1.0" encoding="utf-8"?>
 <p:notes xmlns:a="http://schemas.openxmlformats.org/drawingml/2006/main" xmlns:r="http://schemas.openxmlformats.org/officeDocument/2006/relationships" xmlns:p="http://schemas.openxmlformats.org/presentationml/2006/main">
   <p:cSld>
     <p:spTree>
@@ -2921,7 +3005,7 @@
         </p:nvSpPr>
         <p:spPr>
           <a:xfrm>
-            <a:off x="-1" y="804799"/>
+            <a:off x="209549" y="1652524"/>
             <a:ext cx="3533775" cy="2443226"/>
           </a:xfrm>
         </p:spPr>
@@ -3403,6 +3487,13 @@
   <p:clrMapOvr>
     <a:masterClrMapping/>
   </p:clrMapOvr>
+  <p:timing>
+    <p:tnLst>
+      <p:par>
+        <p:cTn id="1" dur="indefinite" restart="never" nodeType="tmRoot"/>
+      </p:par>
+    </p:tnLst>
+  </p:timing>
 </p:sld>
 </file>
 
@@ -3465,8 +3556,8 @@
           </a:p>
         </p:txBody>
       </p:sp>
-      <mc:AlternateContent xmlns:mc="http://schemas.openxmlformats.org/markup-compatibility/2006">
-        <mc:Choice xmlns:a14="http://schemas.microsoft.com/office/drawing/2010/main" Requires="a14">
+      <mc:AlternateContent xmlns:mc="http://schemas.openxmlformats.org/markup-compatibility/2006" xmlns:a14="http://schemas.microsoft.com/office/drawing/2010/main">
+        <mc:Choice Requires="a14">
           <p:sp>
             <p:nvSpPr>
               <p:cNvPr id="3" name="Content Placeholder 2"/>
@@ -3882,7 +3973,7 @@
             </p:txBody>
           </p:sp>
         </mc:Choice>
-        <mc:Fallback>
+        <mc:Fallback xmlns="">
           <p:sp>
             <p:nvSpPr>
               <p:cNvPr id="3" name="Content Placeholder 2"/>
@@ -4103,6 +4194,13 @@
   <p:clrMapOvr>
     <a:masterClrMapping/>
   </p:clrMapOvr>
+  <p:timing>
+    <p:tnLst>
+      <p:par>
+        <p:cTn id="1" dur="indefinite" restart="never" nodeType="tmRoot"/>
+      </p:par>
+    </p:tnLst>
+  </p:timing>
 </p:sld>
 </file>
 
@@ -4242,6 +4340,13 @@
   <p:clrMapOvr>
     <a:masterClrMapping/>
   </p:clrMapOvr>
+  <p:timing>
+    <p:tnLst>
+      <p:par>
+        <p:cTn id="1" dur="indefinite" restart="never" nodeType="tmRoot"/>
+      </p:par>
+    </p:tnLst>
+  </p:timing>
 </p:sld>
 </file>
 
@@ -4855,6 +4960,13 @@
   <p:clrMapOvr>
     <a:masterClrMapping/>
   </p:clrMapOvr>
+  <p:timing>
+    <p:tnLst>
+      <p:par>
+        <p:cTn id="1" dur="indefinite" restart="never" nodeType="tmRoot"/>
+      </p:par>
+    </p:tnLst>
+  </p:timing>
 </p:sld>
 </file>
 
@@ -5234,6 +5346,13 @@
   <p:clrMapOvr>
     <a:masterClrMapping/>
   </p:clrMapOvr>
+  <p:timing>
+    <p:tnLst>
+      <p:par>
+        <p:cTn id="1" dur="indefinite" restart="never" nodeType="tmRoot"/>
+      </p:par>
+    </p:tnLst>
+  </p:timing>
 </p:sld>
 </file>
 
@@ -5616,6 +5735,13 @@
   <p:clrMapOvr>
     <a:masterClrMapping/>
   </p:clrMapOvr>
+  <p:timing>
+    <p:tnLst>
+      <p:par>
+        <p:cTn id="1" dur="indefinite" restart="never" nodeType="tmRoot"/>
+      </p:par>
+    </p:tnLst>
+  </p:timing>
 </p:sld>
 </file>
 
@@ -6055,6 +6181,13 @@
   <p:clrMapOvr>
     <a:masterClrMapping/>
   </p:clrMapOvr>
+  <p:timing>
+    <p:tnLst>
+      <p:par>
+        <p:cTn id="1" dur="indefinite" restart="never" nodeType="tmRoot"/>
+      </p:par>
+    </p:tnLst>
+  </p:timing>
 </p:sld>
 </file>
 
@@ -6496,6 +6629,13 @@
   <p:clrMapOvr>
     <a:masterClrMapping/>
   </p:clrMapOvr>
+  <p:timing>
+    <p:tnLst>
+      <p:par>
+        <p:cTn id="1" dur="indefinite" restart="never" nodeType="tmRoot"/>
+      </p:par>
+    </p:tnLst>
+  </p:timing>
 </p:sld>
 </file>
 
@@ -6668,6 +6808,13 @@
   <p:clrMapOvr>
     <a:masterClrMapping/>
   </p:clrMapOvr>
+  <p:timing>
+    <p:tnLst>
+      <p:par>
+        <p:cTn id="1" dur="indefinite" restart="never" nodeType="tmRoot"/>
+      </p:par>
+    </p:tnLst>
+  </p:timing>
 </p:sld>
 </file>
 
@@ -6978,6 +7125,13 @@
   <p:clrMapOvr>
     <a:masterClrMapping/>
   </p:clrMapOvr>
+  <p:timing>
+    <p:tnLst>
+      <p:par>
+        <p:cTn id="1" dur="indefinite" restart="never" nodeType="tmRoot"/>
+      </p:par>
+    </p:tnLst>
+  </p:timing>
 </p:sld>
 </file>
 
@@ -7048,8 +7202,8 @@
           </a:p>
         </p:txBody>
       </p:sp>
-      <mc:AlternateContent xmlns:mc="http://schemas.openxmlformats.org/markup-compatibility/2006">
-        <mc:Choice xmlns:a14="http://schemas.microsoft.com/office/drawing/2010/main" Requires="a14">
+      <mc:AlternateContent xmlns:mc="http://schemas.openxmlformats.org/markup-compatibility/2006" xmlns:a14="http://schemas.microsoft.com/office/drawing/2010/main">
+        <mc:Choice Requires="a14">
           <p:sp>
             <p:nvSpPr>
               <p:cNvPr id="7" name="Rectangle 6"/>
@@ -7480,7 +7634,7 @@
             </p:txBody>
           </p:sp>
         </mc:Choice>
-        <mc:Fallback>
+        <mc:Fallback xmlns="">
           <p:sp>
             <p:nvSpPr>
               <p:cNvPr id="7" name="Rectangle 6"/>
@@ -7658,7 +7812,7 @@
       </p:sp>
       <p:sp>
         <p:nvSpPr>
-          <p:cNvPr id="9" name="Content Placeholder 8"/>
+          <p:cNvPr id="2" name="Content Placeholder 1"/>
           <p:cNvSpPr>
             <a:spLocks noGrp="1"/>
           </p:cNvSpPr>
@@ -7671,14 +7825,33 @@
           <a:bodyPr/>
           <a:lstStyle/>
           <a:p>
-            <a:r>
-              <a:rPr lang="en-US" dirty="0" smtClean="0"/>
-              <a:t>PARAMETER TABLE</a:t>
-            </a:r>
-            <a:endParaRPr lang="en-US" dirty="0"/>
+            <a:endParaRPr lang="en-US"/>
           </a:p>
         </p:txBody>
       </p:sp>
+      <p:pic>
+        <p:nvPicPr>
+          <p:cNvPr id="3" name="Picture 2"/>
+          <p:cNvPicPr>
+            <a:picLocks noChangeAspect="1"/>
+          </p:cNvPicPr>
+          <p:nvPr/>
+        </p:nvPicPr>
+        <p:blipFill rotWithShape="1">
+          <a:blip r:embed="rId3"/>
+          <a:srcRect l="21146" t="32485" r="37917" b="34635"/>
+          <a:stretch/>
+        </p:blipFill>
+        <p:spPr>
+          <a:xfrm>
+            <a:off x="457199" y="2454803"/>
+            <a:ext cx="5124450" cy="2790414"/>
+          </a:xfrm>
+          <a:prstGeom prst="rect">
+            <a:avLst/>
+          </a:prstGeom>
+        </p:spPr>
+      </p:pic>
     </p:spTree>
     <p:extLst>
       <p:ext uri="{BB962C8B-B14F-4D97-AF65-F5344CB8AC3E}">
@@ -7689,6 +7862,13 @@
   <p:clrMapOvr>
     <a:masterClrMapping/>
   </p:clrMapOvr>
+  <p:timing>
+    <p:tnLst>
+      <p:par>
+        <p:cTn id="1" dur="indefinite" restart="never" nodeType="tmRoot"/>
+      </p:par>
+    </p:tnLst>
+  </p:timing>
 </p:sld>
 </file>
 
@@ -7751,16 +7931,11 @@
               </a:rPr>
               <a:t> et al model</a:t>
             </a:r>
-            <a:endParaRPr lang="en-US" sz="2000" dirty="0">
-              <a:solidFill>
-                <a:schemeClr val="bg1"/>
-              </a:solidFill>
-            </a:endParaRPr>
           </a:p>
         </p:txBody>
       </p:sp>
-      <mc:AlternateContent xmlns:mc="http://schemas.openxmlformats.org/markup-compatibility/2006">
-        <mc:Choice xmlns:a14="http://schemas.microsoft.com/office/drawing/2010/main" Requires="a14">
+      <mc:AlternateContent xmlns:mc="http://schemas.openxmlformats.org/markup-compatibility/2006" xmlns:a14="http://schemas.microsoft.com/office/drawing/2010/main">
+        <mc:Choice Requires="a14">
           <p:sp>
             <p:nvSpPr>
               <p:cNvPr id="7" name="Rectangle 6"/>
@@ -8191,7 +8366,7 @@
             </p:txBody>
           </p:sp>
         </mc:Choice>
-        <mc:Fallback>
+        <mc:Fallback xmlns="">
           <p:sp>
             <p:nvSpPr>
               <p:cNvPr id="7" name="Rectangle 6"/>
@@ -8367,29 +8542,170 @@
           </a:p>
         </p:txBody>
       </p:sp>
-      <p:sp>
-        <p:nvSpPr>
-          <p:cNvPr id="2" name="Content Placeholder 1"/>
-          <p:cNvSpPr>
-            <a:spLocks noGrp="1"/>
-          </p:cNvSpPr>
-          <p:nvPr>
-            <p:ph idx="1"/>
-          </p:nvPr>
-        </p:nvSpPr>
-        <p:spPr/>
-        <p:txBody>
-          <a:bodyPr/>
-          <a:lstStyle/>
-          <a:p>
-            <a:r>
-              <a:rPr lang="en-US" dirty="0" smtClean="0"/>
-              <a:t>PARAMETER TABLE INTERVENTIONS</a:t>
-            </a:r>
-            <a:endParaRPr lang="en-US" dirty="0"/>
-          </a:p>
-        </p:txBody>
-      </p:sp>
+      <mc:AlternateContent xmlns:mc="http://schemas.openxmlformats.org/markup-compatibility/2006">
+        <mc:Choice xmlns:a14="http://schemas.microsoft.com/office/drawing/2010/main" Requires="a14">
+          <p:sp>
+            <p:nvSpPr>
+              <p:cNvPr id="2" name="Content Placeholder 1"/>
+              <p:cNvSpPr>
+                <a:spLocks noGrp="1"/>
+              </p:cNvSpPr>
+              <p:nvPr>
+                <p:ph idx="1"/>
+              </p:nvPr>
+            </p:nvSpPr>
+            <p:spPr/>
+            <p:txBody>
+              <a:bodyPr/>
+              <a:lstStyle/>
+              <a:p>
+                <a:r>
+                  <a:rPr lang="en-US" dirty="0" smtClean="0"/>
+                  <a:t>Potential interventions:</a:t>
+                </a:r>
+              </a:p>
+              <a:p>
+                <a:pPr lvl="1"/>
+                <a:r>
+                  <a:rPr lang="en-US" i="1" dirty="0" smtClean="0">
+                    <a:latin typeface="Cambria Math" panose="02040503050406030204" pitchFamily="18" charset="0"/>
+                  </a:rPr>
+                  <a:t>I </a:t>
+                </a:r>
+                <a:r>
+                  <a:rPr lang="en-US" dirty="0"/>
+                  <a:t>– </a:t>
+                </a:r>
+                <a:r>
+                  <a:rPr lang="en-US" dirty="0" smtClean="0"/>
+                  <a:t>MDA</a:t>
+                </a:r>
+                <a:r>
+                  <a:rPr lang="en-US" i="1" dirty="0" smtClean="0"/>
+                  <a:t> </a:t>
+                </a:r>
+                <a:endParaRPr lang="en-US" b="0" i="1" dirty="0" smtClean="0"/>
+              </a:p>
+              <a:p>
+                <a:pPr lvl="1"/>
+                <a14:m>
+                  <m:oMath xmlns:m="http://schemas.openxmlformats.org/officeDocument/2006/math">
+                    <m:r>
+                      <a:rPr lang="en-US" b="0" i="1" smtClean="0">
+                        <a:latin typeface="Cambria Math" panose="02040503050406030204" pitchFamily="18" charset="0"/>
+                      </a:rPr>
+                      <m:t>𝑊</m:t>
+                    </m:r>
+                    <m:r>
+                      <a:rPr lang="en-US" b="0" i="1" smtClean="0">
+                        <a:latin typeface="Cambria Math" panose="02040503050406030204" pitchFamily="18" charset="0"/>
+                      </a:rPr>
+                      <m:t>/</m:t>
+                    </m:r>
+                    <m:r>
+                      <a:rPr lang="en-US" b="0" i="1" smtClean="0">
+                        <a:latin typeface="Cambria Math" panose="02040503050406030204" pitchFamily="18" charset="0"/>
+                      </a:rPr>
+                      <m:t>𝑉</m:t>
+                    </m:r>
+                  </m:oMath>
+                </a14:m>
+                <a:r>
+                  <a:rPr lang="en-US" dirty="0" smtClean="0"/>
+                  <a:t> – Vector or intermediate host control</a:t>
+                </a:r>
+              </a:p>
+              <a:p>
+                <a:pPr lvl="1"/>
+                <a14:m>
+                  <m:oMath xmlns:m="http://schemas.openxmlformats.org/officeDocument/2006/math">
+                    <m:r>
+                      <a:rPr lang="en-US" b="0" i="1" smtClean="0">
+                        <a:latin typeface="Cambria Math" panose="02040503050406030204" pitchFamily="18" charset="0"/>
+                      </a:rPr>
+                      <m:t>𝜎</m:t>
+                    </m:r>
+                  </m:oMath>
+                </a14:m>
+                <a:r>
+                  <a:rPr lang="en-US" dirty="0" smtClean="0"/>
+                  <a:t> – Sanitation or education campaign</a:t>
+                </a:r>
+              </a:p>
+              <a:p>
+                <a:pPr lvl="1"/>
+                <a14:m>
+                  <m:oMath xmlns:m="http://schemas.openxmlformats.org/officeDocument/2006/math">
+                    <m:sSub>
+                      <m:sSubPr>
+                        <m:ctrlPr>
+                          <a:rPr lang="en-US" b="0" i="1" smtClean="0">
+                            <a:latin typeface="Cambria Math" panose="02040503050406030204" pitchFamily="18" charset="0"/>
+                          </a:rPr>
+                        </m:ctrlPr>
+                      </m:sSubPr>
+                      <m:e>
+                        <m:r>
+                          <a:rPr lang="en-US" b="0" i="1" smtClean="0">
+                            <a:latin typeface="Cambria Math" panose="02040503050406030204" pitchFamily="18" charset="0"/>
+                          </a:rPr>
+                          <m:t>𝛽</m:t>
+                        </m:r>
+                      </m:e>
+                      <m:sub>
+                        <m:r>
+                          <a:rPr lang="en-US" b="0" i="1" smtClean="0">
+                            <a:latin typeface="Cambria Math" panose="02040503050406030204" pitchFamily="18" charset="0"/>
+                          </a:rPr>
+                          <m:t>𝐸</m:t>
+                        </m:r>
+                      </m:sub>
+                    </m:sSub>
+                  </m:oMath>
+                </a14:m>
+                <a:r>
+                  <a:rPr lang="en-US" dirty="0"/>
+                  <a:t> – Education campaign (exposure avoidance)</a:t>
+                </a:r>
+                <a:endParaRPr lang="en-US" dirty="0"/>
+              </a:p>
+            </p:txBody>
+          </p:sp>
+        </mc:Choice>
+        <mc:Fallback>
+          <p:sp>
+            <p:nvSpPr>
+              <p:cNvPr id="2" name="Content Placeholder 1"/>
+              <p:cNvSpPr>
+                <a:spLocks noGrp="1" noRot="1" noChangeAspect="1" noMove="1" noResize="1" noEditPoints="1" noAdjustHandles="1" noChangeArrowheads="1" noChangeShapeType="1" noTextEdit="1"/>
+              </p:cNvSpPr>
+              <p:nvPr>
+                <p:ph idx="1"/>
+              </p:nvPr>
+            </p:nvSpPr>
+            <p:spPr>
+              <a:blipFill rotWithShape="0">
+                <a:blip r:embed="rId3"/>
+                <a:stretch>
+                  <a:fillRect l="-667" t="-1208"/>
+                </a:stretch>
+              </a:blipFill>
+            </p:spPr>
+            <p:txBody>
+              <a:bodyPr/>
+              <a:lstStyle/>
+              <a:p>
+                <a:r>
+                  <a:rPr lang="en-US">
+                    <a:noFill/>
+                  </a:rPr>
+                  <a:t> </a:t>
+                </a:r>
+              </a:p>
+            </p:txBody>
+          </p:sp>
+        </mc:Fallback>
+      </mc:AlternateContent>
     </p:spTree>
     <p:extLst>
       <p:ext uri="{BB962C8B-B14F-4D97-AF65-F5344CB8AC3E}">
@@ -8400,6 +8716,13 @@
   <p:clrMapOvr>
     <a:masterClrMapping/>
   </p:clrMapOvr>
+  <p:timing>
+    <p:tnLst>
+      <p:par>
+        <p:cTn id="1" dur="indefinite" restart="never" nodeType="tmRoot"/>
+      </p:par>
+    </p:tnLst>
+  </p:timing>
 </p:sld>
 </file>
 
@@ -8470,8 +8793,8 @@
           </a:p>
         </p:txBody>
       </p:sp>
-      <mc:AlternateContent xmlns:mc="http://schemas.openxmlformats.org/markup-compatibility/2006">
-        <mc:Choice xmlns:a14="http://schemas.microsoft.com/office/drawing/2010/main" Requires="a14">
+      <mc:AlternateContent xmlns:mc="http://schemas.openxmlformats.org/markup-compatibility/2006" xmlns:a14="http://schemas.microsoft.com/office/drawing/2010/main">
+        <mc:Choice Requires="a14">
           <p:sp>
             <p:nvSpPr>
               <p:cNvPr id="6" name="Content Placeholder 2"/>
@@ -10044,7 +10367,7 @@
             </p:txBody>
           </p:sp>
         </mc:Choice>
-        <mc:Fallback>
+        <mc:Fallback xmlns="">
           <p:sp>
             <p:nvSpPr>
               <p:cNvPr id="6" name="Content Placeholder 2"/>
@@ -10092,6 +10415,13 @@
   <p:clrMapOvr>
     <a:masterClrMapping/>
   </p:clrMapOvr>
+  <p:timing>
+    <p:tnLst>
+      <p:par>
+        <p:cTn id="1" dur="indefinite" restart="never" nodeType="tmRoot"/>
+      </p:par>
+    </p:tnLst>
+  </p:timing>
 </p:sld>
 </file>
 
@@ -10162,8 +10492,8 @@
           </a:p>
         </p:txBody>
       </p:sp>
-      <mc:AlternateContent xmlns:mc="http://schemas.openxmlformats.org/markup-compatibility/2006">
-        <mc:Choice xmlns:a14="http://schemas.microsoft.com/office/drawing/2010/main" Requires="a14">
+      <mc:AlternateContent xmlns:mc="http://schemas.openxmlformats.org/markup-compatibility/2006" xmlns:a14="http://schemas.microsoft.com/office/drawing/2010/main">
+        <mc:Choice Requires="a14">
           <p:sp>
             <p:nvSpPr>
               <p:cNvPr id="6" name="Content Placeholder 2"/>
@@ -10276,11 +10606,7 @@
                 </a14:m>
                 <a:r>
                   <a:rPr lang="en-US" dirty="0" smtClean="0"/>
-                  <a:t> parameter </a:t>
-                </a:r>
-                <a:r>
-                  <a:rPr lang="en-US" dirty="0" smtClean="0"/>
-                  <a:t>space; across </a:t>
+                  <a:t> parameter space; across </a:t>
                 </a:r>
                 <a:r>
                   <a:rPr lang="en-US" dirty="0"/>
@@ -10326,7 +10652,6 @@
                   <a:rPr lang="en-US" dirty="0" smtClean="0"/>
                   <a:t>, of 0.5, 1.00, 1.50 per person</a:t>
                 </a:r>
-                <a:endParaRPr lang="en-US" dirty="0" smtClean="0"/>
               </a:p>
               <a:p>
                 <a:pPr marL="0" indent="0">
@@ -10337,7 +10662,7 @@
             </p:txBody>
           </p:sp>
         </mc:Choice>
-        <mc:Fallback>
+        <mc:Fallback xmlns="">
           <p:sp>
             <p:nvSpPr>
               <p:cNvPr id="6" name="Content Placeholder 2"/>
@@ -10409,6 +10734,13 @@
   <p:clrMapOvr>
     <a:masterClrMapping/>
   </p:clrMapOvr>
+  <p:timing>
+    <p:tnLst>
+      <p:par>
+        <p:cTn id="1" dur="indefinite" restart="never" nodeType="tmRoot"/>
+      </p:par>
+    </p:tnLst>
+  </p:timing>
 </p:sld>
 </file>
 
@@ -10479,8 +10811,8 @@
           </a:p>
         </p:txBody>
       </p:sp>
-      <mc:AlternateContent xmlns:mc="http://schemas.openxmlformats.org/markup-compatibility/2006">
-        <mc:Choice xmlns:a14="http://schemas.microsoft.com/office/drawing/2010/main" Requires="a14">
+      <mc:AlternateContent xmlns:mc="http://schemas.openxmlformats.org/markup-compatibility/2006" xmlns:a14="http://schemas.microsoft.com/office/drawing/2010/main">
+        <mc:Choice Requires="a14">
           <p:sp>
             <p:nvSpPr>
               <p:cNvPr id="6" name="Content Placeholder 2"/>
@@ -10593,11 +10925,7 @@
                 </a14:m>
                 <a:r>
                   <a:rPr lang="en-US" dirty="0"/>
-                  <a:t> parameter space; across </a:t>
-                </a:r>
-                <a:r>
-                  <a:rPr lang="en-US" dirty="0"/>
-                  <a:t>time horizons, </a:t>
+                  <a:t> parameter space; across time horizons, </a:t>
                 </a:r>
                 <a14:m>
                   <m:oMath xmlns:m="http://schemas.openxmlformats.org/officeDocument/2006/math">
@@ -10611,19 +10939,7 @@
                 </a14:m>
                 <a:r>
                   <a:rPr lang="en-US" dirty="0"/>
-                  <a:t>, of </a:t>
-                </a:r>
-                <a:r>
-                  <a:rPr lang="en-US" dirty="0"/>
-                  <a:t>2, </a:t>
-                </a:r>
-                <a:r>
-                  <a:rPr lang="en-US" dirty="0"/>
-                  <a:t>10, </a:t>
-                </a:r>
-                <a:r>
-                  <a:rPr lang="en-US" dirty="0"/>
-                  <a:t>20 years; and across different levels of available capital, </a:t>
+                  <a:t>, of 2, 10, 20 years; and across different levels of available capital, </a:t>
                 </a:r>
                 <a14:m>
                   <m:oMath xmlns:m="http://schemas.openxmlformats.org/officeDocument/2006/math">
@@ -10709,7 +11025,7 @@
             </p:txBody>
           </p:sp>
         </mc:Choice>
-        <mc:Fallback>
+        <mc:Fallback xmlns="">
           <p:sp>
             <p:nvSpPr>
               <p:cNvPr id="6" name="Content Placeholder 2"/>
@@ -10747,8 +11063,8 @@
           </p:sp>
         </mc:Fallback>
       </mc:AlternateContent>
-      <mc:AlternateContent xmlns:mc="http://schemas.openxmlformats.org/markup-compatibility/2006">
-        <mc:Choice xmlns:a14="http://schemas.microsoft.com/office/drawing/2010/main" Requires="a14">
+      <mc:AlternateContent xmlns:mc="http://schemas.openxmlformats.org/markup-compatibility/2006" xmlns:a14="http://schemas.microsoft.com/office/drawing/2010/main">
+        <mc:Choice Requires="a14">
           <p:sp>
             <p:nvSpPr>
               <p:cNvPr id="2" name="Rectangle 1"/>
@@ -11591,7 +11907,7 @@
             </p:txBody>
           </p:sp>
         </mc:Choice>
-        <mc:Fallback>
+        <mc:Fallback xmlns="">
           <p:sp>
             <p:nvSpPr>
               <p:cNvPr id="2" name="Rectangle 1"/>
@@ -11640,6 +11956,13 @@
   <p:clrMapOvr>
     <a:masterClrMapping/>
   </p:clrMapOvr>
+  <p:timing>
+    <p:tnLst>
+      <p:par>
+        <p:cTn id="1" dur="indefinite" restart="never" nodeType="tmRoot"/>
+      </p:par>
+    </p:tnLst>
+  </p:timing>
 </p:sld>
 </file>
 
@@ -11710,8 +12033,8 @@
           </a:p>
         </p:txBody>
       </p:sp>
-      <mc:AlternateContent xmlns:mc="http://schemas.openxmlformats.org/markup-compatibility/2006">
-        <mc:Choice xmlns:a14="http://schemas.microsoft.com/office/drawing/2010/main" Requires="a14">
+      <mc:AlternateContent xmlns:mc="http://schemas.openxmlformats.org/markup-compatibility/2006" xmlns:a14="http://schemas.microsoft.com/office/drawing/2010/main">
+        <mc:Choice Requires="a14">
           <p:sp>
             <p:nvSpPr>
               <p:cNvPr id="6" name="Content Placeholder 2"/>
@@ -11824,11 +12147,7 @@
                 </a14:m>
                 <a:r>
                   <a:rPr lang="en-US" dirty="0"/>
-                  <a:t> parameter space; across </a:t>
-                </a:r>
-                <a:r>
-                  <a:rPr lang="en-US" dirty="0"/>
-                  <a:t>time horizons, </a:t>
+                  <a:t> parameter space; across time horizons, </a:t>
                 </a:r>
                 <a14:m>
                   <m:oMath xmlns:m="http://schemas.openxmlformats.org/officeDocument/2006/math">
@@ -11842,19 +12161,7 @@
                 </a14:m>
                 <a:r>
                   <a:rPr lang="en-US" dirty="0"/>
-                  <a:t>, of </a:t>
-                </a:r>
-                <a:r>
-                  <a:rPr lang="en-US" dirty="0"/>
-                  <a:t>2, </a:t>
-                </a:r>
-                <a:r>
-                  <a:rPr lang="en-US" dirty="0"/>
-                  <a:t>10, </a:t>
-                </a:r>
-                <a:r>
-                  <a:rPr lang="en-US" dirty="0"/>
-                  <a:t>20 years; and across different levels of available capital, </a:t>
+                  <a:t>, of 2, 10, 20 years; and across different levels of available capital, </a:t>
                 </a:r>
                 <a14:m>
                   <m:oMath xmlns:m="http://schemas.openxmlformats.org/officeDocument/2006/math">
@@ -11940,7 +12247,7 @@
             </p:txBody>
           </p:sp>
         </mc:Choice>
-        <mc:Fallback>
+        <mc:Fallback xmlns="">
           <p:sp>
             <p:nvSpPr>
               <p:cNvPr id="6" name="Content Placeholder 2"/>
@@ -12012,6 +12319,13 @@
   <p:clrMapOvr>
     <a:masterClrMapping/>
   </p:clrMapOvr>
+  <p:timing>
+    <p:tnLst>
+      <p:par>
+        <p:cTn id="1" dur="indefinite" restart="never" nodeType="tmRoot"/>
+      </p:par>
+    </p:tnLst>
+  </p:timing>
 </p:sld>
 </file>
 
@@ -12082,8 +12396,8 @@
           </a:p>
         </p:txBody>
       </p:sp>
-      <mc:AlternateContent xmlns:mc="http://schemas.openxmlformats.org/markup-compatibility/2006">
-        <mc:Choice xmlns:a14="http://schemas.microsoft.com/office/drawing/2010/main" Requires="a14">
+      <mc:AlternateContent xmlns:mc="http://schemas.openxmlformats.org/markup-compatibility/2006" xmlns:a14="http://schemas.microsoft.com/office/drawing/2010/main">
+        <mc:Choice Requires="a14">
           <p:sp>
             <p:nvSpPr>
               <p:cNvPr id="6" name="Content Placeholder 2"/>
@@ -12196,11 +12510,7 @@
                 </a14:m>
                 <a:r>
                   <a:rPr lang="en-US" dirty="0"/>
-                  <a:t> parameter space; across </a:t>
-                </a:r>
-                <a:r>
-                  <a:rPr lang="en-US" dirty="0"/>
-                  <a:t>time horizons, </a:t>
+                  <a:t> parameter space; across time horizons, </a:t>
                 </a:r>
                 <a14:m>
                   <m:oMath xmlns:m="http://schemas.openxmlformats.org/officeDocument/2006/math">
@@ -12214,19 +12524,7 @@
                 </a14:m>
                 <a:r>
                   <a:rPr lang="en-US" dirty="0"/>
-                  <a:t>, of </a:t>
-                </a:r>
-                <a:r>
-                  <a:rPr lang="en-US" dirty="0"/>
-                  <a:t>2, </a:t>
-                </a:r>
-                <a:r>
-                  <a:rPr lang="en-US" dirty="0"/>
-                  <a:t>10, </a:t>
-                </a:r>
-                <a:r>
-                  <a:rPr lang="en-US" dirty="0"/>
-                  <a:t>20 years; and across different levels of available capital, </a:t>
+                  <a:t>, of 2, 10, 20 years; and across different levels of available capital, </a:t>
                 </a:r>
                 <a14:m>
                   <m:oMath xmlns:m="http://schemas.openxmlformats.org/officeDocument/2006/math">
@@ -12312,7 +12610,7 @@
             </p:txBody>
           </p:sp>
         </mc:Choice>
-        <mc:Fallback>
+        <mc:Fallback xmlns="">
           <p:sp>
             <p:nvSpPr>
               <p:cNvPr id="6" name="Content Placeholder 2"/>
@@ -12350,8 +12648,8 @@
           </p:sp>
         </mc:Fallback>
       </mc:AlternateContent>
-      <mc:AlternateContent xmlns:mc="http://schemas.openxmlformats.org/markup-compatibility/2006">
-        <mc:Choice xmlns:a14="http://schemas.microsoft.com/office/drawing/2010/main" Requires="a14">
+      <mc:AlternateContent xmlns:mc="http://schemas.openxmlformats.org/markup-compatibility/2006" xmlns:a14="http://schemas.microsoft.com/office/drawing/2010/main">
+        <mc:Choice Requires="a14">
           <p:sp>
             <p:nvSpPr>
               <p:cNvPr id="2" name="Rectangle 1"/>
@@ -12436,7 +12734,7 @@
             </p:txBody>
           </p:sp>
         </mc:Choice>
-        <mc:Fallback>
+        <mc:Fallback xmlns="">
           <p:sp>
             <p:nvSpPr>
               <p:cNvPr id="2" name="Rectangle 1"/>
@@ -12485,6 +12783,13 @@
   <p:clrMapOvr>
     <a:masterClrMapping/>
   </p:clrMapOvr>
+  <p:timing>
+    <p:tnLst>
+      <p:par>
+        <p:cTn id="1" dur="indefinite" restart="never" nodeType="tmRoot"/>
+      </p:par>
+    </p:tnLst>
+  </p:timing>
 </p:sld>
 </file>
 
@@ -13199,6 +13504,13 @@
   <p:clrMapOvr>
     <a:masterClrMapping/>
   </p:clrMapOvr>
+  <p:timing>
+    <p:tnLst>
+      <p:par>
+        <p:cTn id="1" dur="indefinite" restart="never" nodeType="tmRoot"/>
+      </p:par>
+    </p:tnLst>
+  </p:timing>
 </p:sld>
 </file>
 
@@ -13988,8 +14300,8 @@
           </a:prstGeom>
         </p:spPr>
       </p:pic>
-      <mc:AlternateContent xmlns:mc="http://schemas.openxmlformats.org/markup-compatibility/2006">
-        <mc:Choice xmlns:a14="http://schemas.microsoft.com/office/drawing/2010/main" Requires="a14">
+      <mc:AlternateContent xmlns:mc="http://schemas.openxmlformats.org/markup-compatibility/2006" xmlns:a14="http://schemas.microsoft.com/office/drawing/2010/main">
+        <mc:Choice Requires="a14">
           <p:sp>
             <p:nvSpPr>
               <p:cNvPr id="10" name="TextBox 9"/>
@@ -14053,7 +14365,7 @@
                       <m:sSub>
                         <m:sSubPr>
                           <m:ctrlPr>
-                            <a:rPr lang="en-US" b="0" i="0" smtClean="0">
+                            <a:rPr lang="en-US" b="0" i="1" smtClean="0">
                               <a:latin typeface="Cambria Math" panose="02040503050406030204" pitchFamily="18" charset="0"/>
                             </a:rPr>
                           </m:ctrlPr>
@@ -14095,7 +14407,7 @@
             </p:txBody>
           </p:sp>
         </mc:Choice>
-        <mc:Fallback>
+        <mc:Fallback xmlns="">
           <p:sp>
             <p:nvSpPr>
               <p:cNvPr id="10" name="TextBox 9"/>
@@ -14274,7 +14586,6 @@
               <a:rPr lang="en-US" dirty="0" smtClean="0"/>
               <a:t>Lo et al PNAS</a:t>
             </a:r>
-            <a:endParaRPr lang="en-US" dirty="0" smtClean="0"/>
           </a:p>
           <a:p>
             <a:endParaRPr lang="en-US" dirty="0" smtClean="0"/>
@@ -14308,7 +14619,7 @@
 </file>
 
 <file path=ppt/slides/slide34.xml><?xml version="1.0" encoding="utf-8"?>
-<p:sld xmlns:a="http://schemas.openxmlformats.org/drawingml/2006/main" xmlns:r="http://schemas.openxmlformats.org/officeDocument/2006/relationships" xmlns:p="http://schemas.openxmlformats.org/presentationml/2006/main">
+<p:sld xmlns:a="http://schemas.openxmlformats.org/drawingml/2006/main" xmlns:r="http://schemas.openxmlformats.org/officeDocument/2006/relationships" xmlns:p="http://schemas.openxmlformats.org/presentationml/2006/main" show="0">
   <p:cSld>
     <p:spTree>
       <p:nvGrpSpPr>
@@ -14856,6 +15167,14 @@
   <p:clrMapOvr>
     <a:masterClrMapping/>
   </p:clrMapOvr>
+  <mc:AlternateContent xmlns:mc="http://schemas.openxmlformats.org/markup-compatibility/2006">
+    <mc:Choice xmlns:p14="http://schemas.microsoft.com/office/powerpoint/2010/main" Requires="p14">
+      <p:transition spd="slow" p14:dur="2000"/>
+    </mc:Choice>
+    <mc:Fallback>
+      <p:transition spd="slow"/>
+    </mc:Fallback>
+  </mc:AlternateContent>
   <p:timing>
     <p:tnLst>
       <p:par>
@@ -14925,25 +15244,101 @@
           </a:p>
         </p:txBody>
       </p:sp>
-      <p:sp>
-        <p:nvSpPr>
-          <p:cNvPr id="7" name="Content Placeholder 6"/>
-          <p:cNvSpPr>
-            <a:spLocks noGrp="1"/>
-          </p:cNvSpPr>
-          <p:nvPr>
-            <p:ph idx="1"/>
-          </p:nvPr>
-        </p:nvSpPr>
-        <p:spPr/>
-        <p:txBody>
-          <a:bodyPr/>
-          <a:lstStyle/>
-          <a:p>
-            <a:endParaRPr lang="en-US"/>
-          </a:p>
-        </p:txBody>
-      </p:sp>
+      <mc:AlternateContent xmlns:mc="http://schemas.openxmlformats.org/markup-compatibility/2006">
+        <mc:Choice xmlns:a14="http://schemas.microsoft.com/office/drawing/2010/main" Requires="a14">
+          <p:sp>
+            <p:nvSpPr>
+              <p:cNvPr id="7" name="Content Placeholder 6"/>
+              <p:cNvSpPr>
+                <a:spLocks noGrp="1"/>
+              </p:cNvSpPr>
+              <p:nvPr>
+                <p:ph idx="1"/>
+              </p:nvPr>
+            </p:nvSpPr>
+            <p:spPr>
+              <a:xfrm>
+                <a:off x="0" y="1187980"/>
+                <a:ext cx="2343150" cy="2526418"/>
+              </a:xfrm>
+            </p:spPr>
+            <p:txBody>
+              <a:bodyPr/>
+              <a:lstStyle/>
+              <a:p>
+                <a:r>
+                  <a:rPr lang="en-US" dirty="0" smtClean="0"/>
+                  <a:t>Functions </a:t>
+                </a:r>
+                <a14:m>
+                  <m:oMath xmlns:m="http://schemas.openxmlformats.org/officeDocument/2006/math">
+                    <m:r>
+                      <a:rPr lang="en-US" b="0" i="0" smtClean="0">
+                        <a:latin typeface="Cambria Math" panose="02040503050406030204" pitchFamily="18" charset="0"/>
+                      </a:rPr>
+                      <m:t>(</m:t>
+                    </m:r>
+                    <m:r>
+                      <a:rPr lang="en-US" b="0" i="1" smtClean="0">
+                        <a:latin typeface="Cambria Math" panose="02040503050406030204" pitchFamily="18" charset="0"/>
+                      </a:rPr>
+                      <m:t>𝑓</m:t>
+                    </m:r>
+                    <m:r>
+                      <a:rPr lang="en-US" b="0" i="1" smtClean="0">
+                        <a:latin typeface="Cambria Math" panose="02040503050406030204" pitchFamily="18" charset="0"/>
+                      </a:rPr>
+                      <m:t>)</m:t>
+                    </m:r>
+                  </m:oMath>
+                </a14:m>
+                <a:r>
+                  <a:rPr lang="en-US" dirty="0" smtClean="0"/>
+                  <a:t> of disease prevalence or infection intensity </a:t>
+                </a:r>
+                <a:endParaRPr lang="en-US" dirty="0"/>
+              </a:p>
+            </p:txBody>
+          </p:sp>
+        </mc:Choice>
+        <mc:Fallback>
+          <p:sp>
+            <p:nvSpPr>
+              <p:cNvPr id="7" name="Content Placeholder 6"/>
+              <p:cNvSpPr>
+                <a:spLocks noGrp="1" noRot="1" noChangeAspect="1" noMove="1" noResize="1" noEditPoints="1" noAdjustHandles="1" noChangeArrowheads="1" noChangeShapeType="1" noTextEdit="1"/>
+              </p:cNvSpPr>
+              <p:nvPr>
+                <p:ph idx="1"/>
+              </p:nvPr>
+            </p:nvSpPr>
+            <p:spPr>
+              <a:xfrm>
+                <a:off x="0" y="1187980"/>
+                <a:ext cx="2343150" cy="2526418"/>
+              </a:xfrm>
+              <a:blipFill rotWithShape="0">
+                <a:blip r:embed="rId3"/>
+                <a:stretch>
+                  <a:fillRect l="-2344" t="-1208" r="-5208"/>
+                </a:stretch>
+              </a:blipFill>
+            </p:spPr>
+            <p:txBody>
+              <a:bodyPr/>
+              <a:lstStyle/>
+              <a:p>
+                <a:r>
+                  <a:rPr lang="en-US">
+                    <a:noFill/>
+                  </a:rPr>
+                  <a:t> </a:t>
+                </a:r>
+              </a:p>
+            </p:txBody>
+          </p:sp>
+        </mc:Fallback>
+      </mc:AlternateContent>
       <p:pic>
         <p:nvPicPr>
           <p:cNvPr id="7170" name="Picture 2" descr="https://github.com/cmhoove14/DDNTD/raw/master/Analysis/Model_Sims_files/figure-markdown_github/mate_prob_across_W-1.png"/>
@@ -14953,7 +15348,7 @@
           <p:nvPr/>
         </p:nvPicPr>
         <p:blipFill>
-          <a:blip r:embed="rId2">
+          <a:blip r:embed="rId4">
             <a:extLst>
               <a:ext uri="{28A0092B-C50C-407E-A947-70E740481C1C}">
                 <a14:useLocalDpi xmlns:a14="http://schemas.microsoft.com/office/drawing/2010/main" val="0"/>
@@ -14967,7 +15362,7 @@
         </p:blipFill>
         <p:spPr bwMode="auto">
           <a:xfrm>
-            <a:off x="1371600" y="1120775"/>
+            <a:off x="2428875" y="1082675"/>
             <a:ext cx="6400800" cy="4572000"/>
           </a:xfrm>
           <a:prstGeom prst="rect">
@@ -14995,6 +15390,13 @@
   <p:clrMapOvr>
     <a:masterClrMapping/>
   </p:clrMapOvr>
+  <p:timing>
+    <p:tnLst>
+      <p:par>
+        <p:cTn id="1" dur="indefinite" restart="never" nodeType="tmRoot"/>
+      </p:par>
+    </p:tnLst>
+  </p:timing>
 </p:sld>
 </file>
 
@@ -15057,25 +15459,6 @@
           </a:p>
         </p:txBody>
       </p:sp>
-      <p:sp>
-        <p:nvSpPr>
-          <p:cNvPr id="7" name="Content Placeholder 6"/>
-          <p:cNvSpPr>
-            <a:spLocks noGrp="1"/>
-          </p:cNvSpPr>
-          <p:nvPr>
-            <p:ph idx="1"/>
-          </p:nvPr>
-        </p:nvSpPr>
-        <p:spPr/>
-        <p:txBody>
-          <a:bodyPr/>
-          <a:lstStyle/>
-          <a:p>
-            <a:endParaRPr lang="en-US"/>
-          </a:p>
-        </p:txBody>
-      </p:sp>
       <p:pic>
         <p:nvPicPr>
           <p:cNvPr id="1026" name="Picture 2" descr="https://github.com/cmhoove14/DDNTD/raw/master/Analysis/Model_Sims_files/figure-markdown_github/Reff_curves-1.png"/>
@@ -15099,7 +15482,7 @@
         </p:blipFill>
         <p:spPr bwMode="auto">
           <a:xfrm>
-            <a:off x="1120775" y="1240155"/>
+            <a:off x="2708910" y="1192530"/>
             <a:ext cx="6400800" cy="4572000"/>
           </a:xfrm>
           <a:prstGeom prst="rect">
@@ -15117,6 +15500,162 @@
           </a:extLst>
         </p:spPr>
       </p:pic>
+      <mc:AlternateContent xmlns:mc="http://schemas.openxmlformats.org/markup-compatibility/2006">
+        <mc:Choice xmlns:a14="http://schemas.microsoft.com/office/drawing/2010/main" Requires="a14">
+          <p:sp>
+            <p:nvSpPr>
+              <p:cNvPr id="5" name="Content Placeholder 6"/>
+              <p:cNvSpPr>
+                <a:spLocks noGrp="1"/>
+              </p:cNvSpPr>
+              <p:nvPr>
+                <p:ph idx="1"/>
+              </p:nvPr>
+            </p:nvSpPr>
+            <p:spPr>
+              <a:xfrm>
+                <a:off x="-1" y="1187980"/>
+                <a:ext cx="2581275" cy="2526418"/>
+              </a:xfrm>
+            </p:spPr>
+            <p:txBody>
+              <a:bodyPr/>
+              <a:lstStyle/>
+              <a:p>
+                <a14:m>
+                  <m:oMath xmlns:m="http://schemas.openxmlformats.org/officeDocument/2006/math">
+                    <m:sSub>
+                      <m:sSubPr>
+                        <m:ctrlPr>
+                          <a:rPr lang="en-US" b="0" i="1" smtClean="0">
+                            <a:latin typeface="Cambria Math" panose="02040503050406030204" pitchFamily="18" charset="0"/>
+                          </a:rPr>
+                        </m:ctrlPr>
+                      </m:sSubPr>
+                      <m:e>
+                        <m:r>
+                          <a:rPr lang="en-US" b="0" i="1" smtClean="0">
+                            <a:latin typeface="Cambria Math" panose="02040503050406030204" pitchFamily="18" charset="0"/>
+                          </a:rPr>
+                          <m:t>𝑅</m:t>
+                        </m:r>
+                      </m:e>
+                      <m:sub>
+                        <m:r>
+                          <a:rPr lang="en-US" b="0" i="1" smtClean="0">
+                            <a:latin typeface="Cambria Math" panose="02040503050406030204" pitchFamily="18" charset="0"/>
+                          </a:rPr>
+                          <m:t>𝑒𝑓𝑓</m:t>
+                        </m:r>
+                      </m:sub>
+                    </m:sSub>
+                    <m:r>
+                      <a:rPr lang="en-US" b="0" i="1" smtClean="0">
+                        <a:latin typeface="Cambria Math" panose="02040503050406030204" pitchFamily="18" charset="0"/>
+                        <a:ea typeface="Cambria Math" panose="02040503050406030204" pitchFamily="18" charset="0"/>
+                      </a:rPr>
+                      <m:t>≈</m:t>
+                    </m:r>
+                    <m:sSub>
+                      <m:sSubPr>
+                        <m:ctrlPr>
+                          <a:rPr lang="en-US" b="0" i="1" smtClean="0">
+                            <a:latin typeface="Cambria Math" panose="02040503050406030204" pitchFamily="18" charset="0"/>
+                          </a:rPr>
+                        </m:ctrlPr>
+                      </m:sSubPr>
+                      <m:e>
+                        <m:r>
+                          <a:rPr lang="en-US" b="0" i="1" smtClean="0">
+                            <a:latin typeface="Cambria Math" panose="02040503050406030204" pitchFamily="18" charset="0"/>
+                          </a:rPr>
+                          <m:t>𝑅</m:t>
+                        </m:r>
+                      </m:e>
+                      <m:sub>
+                        <m:r>
+                          <a:rPr lang="en-US" b="0" i="1" smtClean="0">
+                            <a:latin typeface="Cambria Math" panose="02040503050406030204" pitchFamily="18" charset="0"/>
+                          </a:rPr>
+                          <m:t>0</m:t>
+                        </m:r>
+                      </m:sub>
+                    </m:sSub>
+                    <m:r>
+                      <a:rPr lang="en-US" b="0" i="1" smtClean="0">
+                        <a:latin typeface="Cambria Math" panose="02040503050406030204" pitchFamily="18" charset="0"/>
+                      </a:rPr>
+                      <m:t>∗</m:t>
+                    </m:r>
+                    <m:r>
+                      <a:rPr lang="en-US" b="1" i="1" smtClean="0">
+                        <a:latin typeface="Cambria Math" panose="02040503050406030204" pitchFamily="18" charset="0"/>
+                      </a:rPr>
+                      <m:t>𝒇</m:t>
+                    </m:r>
+                    <m:r>
+                      <a:rPr lang="en-US" b="0" i="1" smtClean="0">
+                        <a:latin typeface="Cambria Math" panose="02040503050406030204" pitchFamily="18" charset="0"/>
+                      </a:rPr>
+                      <m:t>(</m:t>
+                    </m:r>
+                    <m:r>
+                      <a:rPr lang="en-US" b="0" i="1" smtClean="0">
+                        <a:latin typeface="Cambria Math" panose="02040503050406030204" pitchFamily="18" charset="0"/>
+                      </a:rPr>
+                      <m:t>𝑊</m:t>
+                    </m:r>
+                    <m:r>
+                      <a:rPr lang="en-US" b="0" i="1" smtClean="0">
+                        <a:latin typeface="Cambria Math" panose="02040503050406030204" pitchFamily="18" charset="0"/>
+                      </a:rPr>
+                      <m:t>)</m:t>
+                    </m:r>
+                  </m:oMath>
+                </a14:m>
+                <a:endParaRPr lang="en-US" dirty="0"/>
+              </a:p>
+            </p:txBody>
+          </p:sp>
+        </mc:Choice>
+        <mc:Fallback>
+          <p:sp>
+            <p:nvSpPr>
+              <p:cNvPr id="5" name="Content Placeholder 6"/>
+              <p:cNvSpPr>
+                <a:spLocks noGrp="1" noRot="1" noChangeAspect="1" noMove="1" noResize="1" noEditPoints="1" noAdjustHandles="1" noChangeArrowheads="1" noChangeShapeType="1" noTextEdit="1"/>
+              </p:cNvSpPr>
+              <p:nvPr>
+                <p:ph idx="1"/>
+              </p:nvPr>
+            </p:nvSpPr>
+            <p:spPr>
+              <a:xfrm>
+                <a:off x="-1" y="1187980"/>
+                <a:ext cx="2581275" cy="2526418"/>
+              </a:xfrm>
+              <a:blipFill rotWithShape="0">
+                <a:blip r:embed="rId3"/>
+                <a:stretch>
+                  <a:fillRect l="-2128" t="-725"/>
+                </a:stretch>
+              </a:blipFill>
+            </p:spPr>
+            <p:txBody>
+              <a:bodyPr/>
+              <a:lstStyle/>
+              <a:p>
+                <a:r>
+                  <a:rPr lang="en-US">
+                    <a:noFill/>
+                  </a:rPr>
+                  <a:t> </a:t>
+                </a:r>
+              </a:p>
+            </p:txBody>
+          </p:sp>
+        </mc:Fallback>
+      </mc:AlternateContent>
     </p:spTree>
     <p:extLst>
       <p:ext uri="{BB962C8B-B14F-4D97-AF65-F5344CB8AC3E}">
@@ -15127,6 +15666,13 @@
   <p:clrMapOvr>
     <a:masterClrMapping/>
   </p:clrMapOvr>
+  <p:timing>
+    <p:tnLst>
+      <p:par>
+        <p:cTn id="1" dur="indefinite" restart="never" nodeType="tmRoot"/>
+      </p:par>
+    </p:tnLst>
+  </p:timing>
 </p:sld>
 </file>
 
@@ -15360,6 +15906,13 @@
   <p:clrMapOvr>
     <a:masterClrMapping/>
   </p:clrMapOvr>
+  <p:timing>
+    <p:tnLst>
+      <p:par>
+        <p:cTn id="1" dur="indefinite" restart="never" nodeType="tmRoot"/>
+      </p:par>
+    </p:tnLst>
+  </p:timing>
 </p:sld>
 </file>
 
@@ -15570,8 +16123,8 @@
           </a:p>
         </p:txBody>
       </p:sp>
-      <mc:AlternateContent xmlns:mc="http://schemas.openxmlformats.org/markup-compatibility/2006">
-        <mc:Choice xmlns:a14="http://schemas.microsoft.com/office/drawing/2010/main" Requires="a14">
+      <mc:AlternateContent xmlns:mc="http://schemas.openxmlformats.org/markup-compatibility/2006" xmlns:a14="http://schemas.microsoft.com/office/drawing/2010/main">
+        <mc:Choice Requires="a14">
           <p:sp>
             <p:nvSpPr>
               <p:cNvPr id="7" name="Content Placeholder 6"/>
@@ -15596,31 +16149,7 @@
               <a:p>
                 <a:r>
                   <a:rPr lang="en-US" dirty="0" smtClean="0"/>
-                  <a:t>Interventions </a:t>
-                </a:r>
-                <a:r>
-                  <a:rPr lang="en-US" dirty="0" smtClean="0"/>
-                  <a:t>such as snail </a:t>
-                </a:r>
-                <a:r>
-                  <a:rPr lang="en-US" dirty="0" smtClean="0"/>
-                  <a:t>habitat </a:t>
-                </a:r>
-                <a:r>
-                  <a:rPr lang="en-US" dirty="0" smtClean="0"/>
-                  <a:t>reduction, </a:t>
-                </a:r>
-                <a:r>
-                  <a:rPr lang="en-US" dirty="0" smtClean="0"/>
-                  <a:t>sanitation, </a:t>
-                </a:r>
-                <a:r>
-                  <a:rPr lang="en-US" dirty="0" smtClean="0"/>
-                  <a:t>education </a:t>
-                </a:r>
-                <a:r>
-                  <a:rPr lang="en-US" dirty="0" smtClean="0"/>
-                  <a:t>suppress </a:t>
+                  <a:t>Interventions such as snail habitat reduction, sanitation, education suppress </a:t>
                 </a:r>
                 <a14:m>
                   <m:oMath xmlns:m="http://schemas.openxmlformats.org/officeDocument/2006/math">
@@ -15684,7 +16213,7 @@
             </p:txBody>
           </p:sp>
         </mc:Choice>
-        <mc:Fallback>
+        <mc:Fallback xmlns="">
           <p:sp>
             <p:nvSpPr>
               <p:cNvPr id="7" name="Content Placeholder 6"/>
@@ -15889,7 +16418,6 @@
               <a:rPr lang="en-US" dirty="0" smtClean="0"/>
               <a:t>Where reservoirs of infection are sufficient to maintain parasite populations above the breakpoint (insufficient coverage)</a:t>
             </a:r>
-            <a:endParaRPr lang="en-US" dirty="0" smtClean="0"/>
           </a:p>
         </p:txBody>
       </p:sp>
@@ -15927,6 +16455,13 @@
   <p:clrMapOvr>
     <a:masterClrMapping/>
   </p:clrMapOvr>
+  <p:timing>
+    <p:tnLst>
+      <p:par>
+        <p:cTn id="1" dur="indefinite" restart="never" nodeType="tmRoot"/>
+      </p:par>
+    </p:tnLst>
+  </p:timing>
 </p:sld>
 </file>
 

</xml_diff>